<commit_message>
Slight amendment to slides
</commit_message>
<xml_diff>
--- a/05-timers/01-Day/Slideshows/ReviewJSDay.pptx
+++ b/05-timers/01-Day/Slideshows/ReviewJSDay.pptx
@@ -226,7 +226,7 @@
           <a:p>
             <a:fld id="{51A969EA-8566-418D-AC96-BC5F6E9FAB6C}" type="datetimeFigureOut">
               <a:rPr lang="en-US" smtClean="0"/>
-              <a:t>1/22/18</a:t>
+              <a:t>6/2/2018</a:t>
             </a:fld>
             <a:endParaRPr lang="en-US"/>
           </a:p>
@@ -391,7 +391,7 @@
           <a:p>
             <a:fld id="{33B07B4B-74D8-4C42-A719-1F93879497F8}" type="datetimeFigureOut">
               <a:rPr lang="en-US" smtClean="0"/>
-              <a:t>1/22/18</a:t>
+              <a:t>6/2/2018</a:t>
             </a:fld>
             <a:endParaRPr lang="en-US"/>
           </a:p>
@@ -1957,18 +1957,7 @@
                 <a:ea typeface="Roboto" panose="02000000000000000000" pitchFamily="2" charset="0"/>
                 <a:cs typeface="Arial" panose="020B0604020202020204" pitchFamily="34" charset="0"/>
               </a:rPr>
-              <a:t>The Coding </a:t>
-            </a:r>
-            <a:r>
-              <a:rPr lang="en-US" sz="2000" b="1" dirty="0" smtClean="0">
-                <a:solidFill>
-                  <a:schemeClr val="bg1"/>
-                </a:solidFill>
-                <a:latin typeface="Arial" panose="020B0604020202020204" pitchFamily="34" charset="0"/>
-                <a:ea typeface="Roboto" panose="02000000000000000000" pitchFamily="2" charset="0"/>
-                <a:cs typeface="Arial" panose="020B0604020202020204" pitchFamily="34" charset="0"/>
-              </a:rPr>
-              <a:t>Bootcamp</a:t>
+              <a:t>The Coding Bootcamp</a:t>
             </a:r>
             <a:endParaRPr lang="en-US" sz="2000" dirty="0">
               <a:solidFill>
@@ -2589,7 +2578,7 @@
           <a:p>
             <a:fld id="{B65C9255-9F07-4181-9AD2-897FFC0A3B7E}" type="datetimeFigureOut">
               <a:rPr lang="en-US" smtClean="0"/>
-              <a:t>1/22/18</a:t>
+              <a:t>6/2/2018</a:t>
             </a:fld>
             <a:endParaRPr lang="en-US"/>
           </a:p>
@@ -3027,7 +3016,7 @@
         </p:spPr>
         <p:txBody>
           <a:bodyPr>
-            <a:normAutofit fontScale="92500" lnSpcReduction="20000"/>
+            <a:normAutofit fontScale="85000" lnSpcReduction="20000"/>
           </a:bodyPr>
           <a:lstStyle/>
           <a:p>
@@ -3056,7 +3045,7 @@
         </p:spPr>
         <p:txBody>
           <a:bodyPr>
-            <a:normAutofit fontScale="92500" lnSpcReduction="20000"/>
+            <a:normAutofit fontScale="85000" lnSpcReduction="20000"/>
           </a:bodyPr>
           <a:lstStyle/>
           <a:p>
@@ -4315,7 +4304,7 @@
                 <a:ea typeface="Roboto" panose="02000000000000000000" pitchFamily="2" charset="0"/>
                 <a:cs typeface="Arial" panose="020B0604020202020204" pitchFamily="34" charset="0"/>
               </a:rPr>
-              <a:t>Comfortably build the Hangman Game (HW 3) from scratch?</a:t>
+              <a:t>Comfortably build the jQuery calculator from scratch?</a:t>
             </a:r>
           </a:p>
           <a:p>
@@ -4344,7 +4333,7 @@
                 <a:ea typeface="Roboto" panose="02000000000000000000" pitchFamily="2" charset="0"/>
                 <a:cs typeface="Arial" panose="020B0604020202020204" pitchFamily="34" charset="0"/>
               </a:rPr>
-              <a:t>No? Then start with Hangman.</a:t>
+              <a:t>No? Then start with the jQuery calculator.</a:t>
             </a:r>
           </a:p>
           <a:p>
@@ -4562,23 +4551,7 @@
                 <a:ea typeface="Roboto" panose="02000000000000000000" pitchFamily="2" charset="0"/>
                 <a:cs typeface="Arial" panose="020B0604020202020204" pitchFamily="34" charset="0"/>
               </a:rPr>
-              <a:t>No? Then start with the </a:t>
-            </a:r>
-            <a:r>
-              <a:rPr lang="en-US" sz="1500">
-                <a:latin typeface="Arial" panose="020B0604020202020204" pitchFamily="34" charset="0"/>
-                <a:ea typeface="Roboto" panose="02000000000000000000" pitchFamily="2" charset="0"/>
-                <a:cs typeface="Arial" panose="020B0604020202020204" pitchFamily="34" charset="0"/>
-              </a:rPr>
-              <a:t>Bootstrap Portfolio Assignment</a:t>
-            </a:r>
-            <a:r>
-              <a:rPr lang="en-US" sz="1500" dirty="0">
-                <a:latin typeface="Arial" panose="020B0604020202020204" pitchFamily="34" charset="0"/>
-                <a:ea typeface="Roboto" panose="02000000000000000000" pitchFamily="2" charset="0"/>
-                <a:cs typeface="Arial" panose="020B0604020202020204" pitchFamily="34" charset="0"/>
-              </a:rPr>
-              <a:t>.</a:t>
+              <a:t>No? Then start with the Bootstrap Portfolio Assignment.</a:t>
             </a:r>
           </a:p>
           <a:p>

</xml_diff>